<commit_message>
visual details improved, output plots renamed
ToDo: make presentation
</commit_message>
<xml_diff>
--- a/presentation.pptx
+++ b/presentation.pptx
@@ -7,6 +7,14 @@
   <p:sldIdLst>
     <p:sldId id="256" r:id="rId2"/>
     <p:sldId id="257" r:id="rId3"/>
+    <p:sldId id="259" r:id="rId4"/>
+    <p:sldId id="258" r:id="rId5"/>
+    <p:sldId id="260" r:id="rId6"/>
+    <p:sldId id="261" r:id="rId7"/>
+    <p:sldId id="262" r:id="rId8"/>
+    <p:sldId id="263" r:id="rId9"/>
+    <p:sldId id="264" r:id="rId10"/>
+    <p:sldId id="265" r:id="rId11"/>
   </p:sldIdLst>
   <p:sldSz cx="12192000" cy="6858000"/>
   <p:notesSz cx="6858000" cy="9144000"/>
@@ -105,6 +113,11 @@
       </a:defRPr>
     </a:lvl9pPr>
   </p:defaultTextStyle>
+  <p:extLst>
+    <p:ext uri="{EFAFB233-063F-42B5-8137-9DF3F51BA10A}">
+      <p15:sldGuideLst xmlns:p15="http://schemas.microsoft.com/office/powerpoint/2012/main"/>
+    </p:ext>
+  </p:extLst>
 </p:presentation>
 </file>
 
@@ -239,7 +252,7 @@
           <a:p>
             <a:fld id="{AF8AA6AE-9D01-4168-854E-6592707BEBE6}" type="datetimeFigureOut">
               <a:rPr lang="de-AT" smtClean="0"/>
-              <a:t>02.10.2020</a:t>
+              <a:t>05.10.2020</a:t>
             </a:fld>
             <a:endParaRPr lang="de-AT"/>
           </a:p>
@@ -409,7 +422,7 @@
           <a:p>
             <a:fld id="{AF8AA6AE-9D01-4168-854E-6592707BEBE6}" type="datetimeFigureOut">
               <a:rPr lang="de-AT" smtClean="0"/>
-              <a:t>02.10.2020</a:t>
+              <a:t>05.10.2020</a:t>
             </a:fld>
             <a:endParaRPr lang="de-AT"/>
           </a:p>
@@ -589,7 +602,7 @@
           <a:p>
             <a:fld id="{AF8AA6AE-9D01-4168-854E-6592707BEBE6}" type="datetimeFigureOut">
               <a:rPr lang="de-AT" smtClean="0"/>
-              <a:t>02.10.2020</a:t>
+              <a:t>05.10.2020</a:t>
             </a:fld>
             <a:endParaRPr lang="de-AT"/>
           </a:p>
@@ -759,7 +772,7 @@
           <a:p>
             <a:fld id="{AF8AA6AE-9D01-4168-854E-6592707BEBE6}" type="datetimeFigureOut">
               <a:rPr lang="de-AT" smtClean="0"/>
-              <a:t>02.10.2020</a:t>
+              <a:t>05.10.2020</a:t>
             </a:fld>
             <a:endParaRPr lang="de-AT"/>
           </a:p>
@@ -1005,7 +1018,7 @@
           <a:p>
             <a:fld id="{AF8AA6AE-9D01-4168-854E-6592707BEBE6}" type="datetimeFigureOut">
               <a:rPr lang="de-AT" smtClean="0"/>
-              <a:t>02.10.2020</a:t>
+              <a:t>05.10.2020</a:t>
             </a:fld>
             <a:endParaRPr lang="de-AT"/>
           </a:p>
@@ -1237,7 +1250,7 @@
           <a:p>
             <a:fld id="{AF8AA6AE-9D01-4168-854E-6592707BEBE6}" type="datetimeFigureOut">
               <a:rPr lang="de-AT" smtClean="0"/>
-              <a:t>02.10.2020</a:t>
+              <a:t>05.10.2020</a:t>
             </a:fld>
             <a:endParaRPr lang="de-AT"/>
           </a:p>
@@ -1604,7 +1617,7 @@
           <a:p>
             <a:fld id="{AF8AA6AE-9D01-4168-854E-6592707BEBE6}" type="datetimeFigureOut">
               <a:rPr lang="de-AT" smtClean="0"/>
-              <a:t>02.10.2020</a:t>
+              <a:t>05.10.2020</a:t>
             </a:fld>
             <a:endParaRPr lang="de-AT"/>
           </a:p>
@@ -1722,7 +1735,7 @@
           <a:p>
             <a:fld id="{AF8AA6AE-9D01-4168-854E-6592707BEBE6}" type="datetimeFigureOut">
               <a:rPr lang="de-AT" smtClean="0"/>
-              <a:t>02.10.2020</a:t>
+              <a:t>05.10.2020</a:t>
             </a:fld>
             <a:endParaRPr lang="de-AT"/>
           </a:p>
@@ -1817,7 +1830,7 @@
           <a:p>
             <a:fld id="{AF8AA6AE-9D01-4168-854E-6592707BEBE6}" type="datetimeFigureOut">
               <a:rPr lang="de-AT" smtClean="0"/>
-              <a:t>02.10.2020</a:t>
+              <a:t>05.10.2020</a:t>
             </a:fld>
             <a:endParaRPr lang="de-AT"/>
           </a:p>
@@ -2094,7 +2107,7 @@
           <a:p>
             <a:fld id="{AF8AA6AE-9D01-4168-854E-6592707BEBE6}" type="datetimeFigureOut">
               <a:rPr lang="de-AT" smtClean="0"/>
-              <a:t>02.10.2020</a:t>
+              <a:t>05.10.2020</a:t>
             </a:fld>
             <a:endParaRPr lang="de-AT"/>
           </a:p>
@@ -2347,7 +2360,7 @@
           <a:p>
             <a:fld id="{AF8AA6AE-9D01-4168-854E-6592707BEBE6}" type="datetimeFigureOut">
               <a:rPr lang="de-AT" smtClean="0"/>
-              <a:t>02.10.2020</a:t>
+              <a:t>05.10.2020</a:t>
             </a:fld>
             <a:endParaRPr lang="de-AT"/>
           </a:p>
@@ -2560,7 +2573,7 @@
           <a:p>
             <a:fld id="{AF8AA6AE-9D01-4168-854E-6592707BEBE6}" type="datetimeFigureOut">
               <a:rPr lang="de-AT" smtClean="0"/>
-              <a:t>02.10.2020</a:t>
+              <a:t>05.10.2020</a:t>
             </a:fld>
             <a:endParaRPr lang="de-AT"/>
           </a:p>
@@ -3015,7 +3028,15 @@
           <a:p>
             <a:r>
               <a:rPr lang="en-US" dirty="0" smtClean="0"/>
-              <a:t>Preliminary results – 2020-10-01</a:t>
+              <a:t>Philemon </a:t>
+            </a:r>
+            <a:r>
+              <a:rPr lang="en-US" dirty="0" err="1" smtClean="0"/>
+              <a:t>Schöpf</a:t>
+            </a:r>
+            <a:r>
+              <a:rPr lang="en-US" dirty="0" smtClean="0"/>
+              <a:t> – 2020-10-05</a:t>
             </a:r>
             <a:endParaRPr lang="de-AT" dirty="0"/>
           </a:p>
@@ -3031,6 +3052,92 @@
   <p:clrMapOvr>
     <a:masterClrMapping/>
   </p:clrMapOvr>
+  <p:timing>
+    <p:tnLst>
+      <p:par>
+        <p:cTn id="1" dur="indefinite" restart="never" nodeType="tmRoot"/>
+      </p:par>
+    </p:tnLst>
+  </p:timing>
+</p:sld>
+</file>
+
+<file path=ppt/slides/slide10.xml><?xml version="1.0" encoding="utf-8"?>
+<p:sld xmlns:a="http://schemas.openxmlformats.org/drawingml/2006/main" xmlns:r="http://schemas.openxmlformats.org/officeDocument/2006/relationships" xmlns:p="http://schemas.openxmlformats.org/presentationml/2006/main">
+  <p:cSld>
+    <p:spTree>
+      <p:nvGrpSpPr>
+        <p:cNvPr id="1" name=""/>
+        <p:cNvGrpSpPr/>
+        <p:nvPr/>
+      </p:nvGrpSpPr>
+      <p:grpSpPr>
+        <a:xfrm>
+          <a:off x="0" y="0"/>
+          <a:ext cx="0" cy="0"/>
+          <a:chOff x="0" y="0"/>
+          <a:chExt cx="0" cy="0"/>
+        </a:xfrm>
+      </p:grpSpPr>
+      <p:sp>
+        <p:nvSpPr>
+          <p:cNvPr id="2" name="Title 1"/>
+          <p:cNvSpPr>
+            <a:spLocks noGrp="1"/>
+          </p:cNvSpPr>
+          <p:nvPr>
+            <p:ph type="title"/>
+          </p:nvPr>
+        </p:nvSpPr>
+        <p:spPr/>
+        <p:txBody>
+          <a:bodyPr/>
+          <a:lstStyle/>
+          <a:p>
+            <a:r>
+              <a:rPr lang="en-US" dirty="0" smtClean="0"/>
+              <a:t>Additional images (high res)</a:t>
+            </a:r>
+            <a:endParaRPr lang="de-AT" dirty="0"/>
+          </a:p>
+        </p:txBody>
+      </p:sp>
+      <p:sp>
+        <p:nvSpPr>
+          <p:cNvPr id="7" name="Content Placeholder 6"/>
+          <p:cNvSpPr>
+            <a:spLocks noGrp="1"/>
+          </p:cNvSpPr>
+          <p:nvPr>
+            <p:ph idx="1"/>
+          </p:nvPr>
+        </p:nvSpPr>
+        <p:spPr/>
+        <p:txBody>
+          <a:bodyPr/>
+          <a:lstStyle/>
+          <a:p>
+            <a:endParaRPr lang="de-AT"/>
+          </a:p>
+        </p:txBody>
+      </p:sp>
+    </p:spTree>
+    <p:extLst>
+      <p:ext uri="{BB962C8B-B14F-4D97-AF65-F5344CB8AC3E}">
+        <p14:creationId xmlns:p14="http://schemas.microsoft.com/office/powerpoint/2010/main" val="165333452"/>
+      </p:ext>
+    </p:extLst>
+  </p:cSld>
+  <p:clrMapOvr>
+    <a:masterClrMapping/>
+  </p:clrMapOvr>
+  <p:timing>
+    <p:tnLst>
+      <p:par>
+        <p:cTn id="1" dur="indefinite" restart="never" nodeType="tmRoot"/>
+      </p:par>
+    </p:tnLst>
+  </p:timing>
 </p:sld>
 </file>
 
@@ -3066,13 +3173,21 @@
           <a:bodyPr/>
           <a:lstStyle/>
           <a:p>
+            <a:r>
+              <a:rPr lang="en-US" dirty="0" err="1" smtClean="0"/>
+              <a:t>Myc</a:t>
+            </a:r>
+            <a:r>
+              <a:rPr lang="en-US" dirty="0" smtClean="0"/>
+              <a:t>/BASP1 ratios in cell lines</a:t>
+            </a:r>
             <a:endParaRPr lang="de-AT" dirty="0"/>
           </a:p>
         </p:txBody>
       </p:sp>
       <p:sp>
         <p:nvSpPr>
-          <p:cNvPr id="3" name="Content Placeholder 2"/>
+          <p:cNvPr id="7" name="Content Placeholder 6"/>
           <p:cNvSpPr>
             <a:spLocks noGrp="1"/>
           </p:cNvSpPr>
@@ -3099,6 +3214,586 @@
   <p:clrMapOvr>
     <a:masterClrMapping/>
   </p:clrMapOvr>
+  <p:timing>
+    <p:tnLst>
+      <p:par>
+        <p:cTn id="1" dur="indefinite" restart="never" nodeType="tmRoot"/>
+      </p:par>
+    </p:tnLst>
+  </p:timing>
+</p:sld>
+</file>
+
+<file path=ppt/slides/slide3.xml><?xml version="1.0" encoding="utf-8"?>
+<p:sld xmlns:a="http://schemas.openxmlformats.org/drawingml/2006/main" xmlns:r="http://schemas.openxmlformats.org/officeDocument/2006/relationships" xmlns:p="http://schemas.openxmlformats.org/presentationml/2006/main">
+  <p:cSld>
+    <p:spTree>
+      <p:nvGrpSpPr>
+        <p:cNvPr id="1" name=""/>
+        <p:cNvGrpSpPr/>
+        <p:nvPr/>
+      </p:nvGrpSpPr>
+      <p:grpSpPr>
+        <a:xfrm>
+          <a:off x="0" y="0"/>
+          <a:ext cx="0" cy="0"/>
+          <a:chOff x="0" y="0"/>
+          <a:chExt cx="0" cy="0"/>
+        </a:xfrm>
+      </p:grpSpPr>
+      <p:sp>
+        <p:nvSpPr>
+          <p:cNvPr id="2" name="Title 1"/>
+          <p:cNvSpPr>
+            <a:spLocks noGrp="1"/>
+          </p:cNvSpPr>
+          <p:nvPr>
+            <p:ph type="title"/>
+          </p:nvPr>
+        </p:nvSpPr>
+        <p:spPr/>
+        <p:txBody>
+          <a:bodyPr/>
+          <a:lstStyle/>
+          <a:p>
+            <a:r>
+              <a:rPr lang="en-US" dirty="0" err="1" smtClean="0"/>
+              <a:t>Myc</a:t>
+            </a:r>
+            <a:r>
+              <a:rPr lang="en-US" dirty="0" smtClean="0"/>
+              <a:t>/BASP1 ratios in patient samples</a:t>
+            </a:r>
+            <a:endParaRPr lang="de-AT" dirty="0"/>
+          </a:p>
+        </p:txBody>
+      </p:sp>
+      <p:sp>
+        <p:nvSpPr>
+          <p:cNvPr id="5" name="Content Placeholder 4"/>
+          <p:cNvSpPr>
+            <a:spLocks noGrp="1"/>
+          </p:cNvSpPr>
+          <p:nvPr>
+            <p:ph idx="1"/>
+          </p:nvPr>
+        </p:nvSpPr>
+        <p:spPr/>
+        <p:txBody>
+          <a:bodyPr/>
+          <a:lstStyle/>
+          <a:p>
+            <a:endParaRPr lang="de-AT"/>
+          </a:p>
+        </p:txBody>
+      </p:sp>
+    </p:spTree>
+    <p:extLst>
+      <p:ext uri="{BB962C8B-B14F-4D97-AF65-F5344CB8AC3E}">
+        <p14:creationId xmlns:p14="http://schemas.microsoft.com/office/powerpoint/2010/main" val="3273889939"/>
+      </p:ext>
+    </p:extLst>
+  </p:cSld>
+  <p:clrMapOvr>
+    <a:masterClrMapping/>
+  </p:clrMapOvr>
+  <p:timing>
+    <p:tnLst>
+      <p:par>
+        <p:cTn id="1" dur="indefinite" restart="never" nodeType="tmRoot"/>
+      </p:par>
+    </p:tnLst>
+  </p:timing>
+</p:sld>
+</file>
+
+<file path=ppt/slides/slide4.xml><?xml version="1.0" encoding="utf-8"?>
+<p:sld xmlns:a="http://schemas.openxmlformats.org/drawingml/2006/main" xmlns:r="http://schemas.openxmlformats.org/officeDocument/2006/relationships" xmlns:p="http://schemas.openxmlformats.org/presentationml/2006/main">
+  <p:cSld>
+    <p:spTree>
+      <p:nvGrpSpPr>
+        <p:cNvPr id="1" name=""/>
+        <p:cNvGrpSpPr/>
+        <p:nvPr/>
+      </p:nvGrpSpPr>
+      <p:grpSpPr>
+        <a:xfrm>
+          <a:off x="0" y="0"/>
+          <a:ext cx="0" cy="0"/>
+          <a:chOff x="0" y="0"/>
+          <a:chExt cx="0" cy="0"/>
+        </a:xfrm>
+      </p:grpSpPr>
+      <p:sp>
+        <p:nvSpPr>
+          <p:cNvPr id="2" name="Title 1"/>
+          <p:cNvSpPr>
+            <a:spLocks noGrp="1"/>
+          </p:cNvSpPr>
+          <p:nvPr>
+            <p:ph type="title"/>
+          </p:nvPr>
+        </p:nvSpPr>
+        <p:spPr/>
+        <p:txBody>
+          <a:bodyPr/>
+          <a:lstStyle/>
+          <a:p>
+            <a:r>
+              <a:rPr lang="en-US" dirty="0" err="1" smtClean="0"/>
+              <a:t>Myc</a:t>
+            </a:r>
+            <a:r>
+              <a:rPr lang="en-US" dirty="0" smtClean="0"/>
+              <a:t>/PHB1 ratios in cell lines</a:t>
+            </a:r>
+            <a:endParaRPr lang="de-AT" dirty="0"/>
+          </a:p>
+        </p:txBody>
+      </p:sp>
+      <p:sp>
+        <p:nvSpPr>
+          <p:cNvPr id="11" name="Content Placeholder 10"/>
+          <p:cNvSpPr>
+            <a:spLocks noGrp="1"/>
+          </p:cNvSpPr>
+          <p:nvPr>
+            <p:ph idx="1"/>
+          </p:nvPr>
+        </p:nvSpPr>
+        <p:spPr/>
+        <p:txBody>
+          <a:bodyPr/>
+          <a:lstStyle/>
+          <a:p>
+            <a:endParaRPr lang="de-AT"/>
+          </a:p>
+        </p:txBody>
+      </p:sp>
+    </p:spTree>
+    <p:extLst>
+      <p:ext uri="{BB962C8B-B14F-4D97-AF65-F5344CB8AC3E}">
+        <p14:creationId xmlns:p14="http://schemas.microsoft.com/office/powerpoint/2010/main" val="699531405"/>
+      </p:ext>
+    </p:extLst>
+  </p:cSld>
+  <p:clrMapOvr>
+    <a:masterClrMapping/>
+  </p:clrMapOvr>
+  <p:timing>
+    <p:tnLst>
+      <p:par>
+        <p:cTn id="1" dur="indefinite" restart="never" nodeType="tmRoot"/>
+      </p:par>
+    </p:tnLst>
+  </p:timing>
+</p:sld>
+</file>
+
+<file path=ppt/slides/slide5.xml><?xml version="1.0" encoding="utf-8"?>
+<p:sld xmlns:a="http://schemas.openxmlformats.org/drawingml/2006/main" xmlns:r="http://schemas.openxmlformats.org/officeDocument/2006/relationships" xmlns:p="http://schemas.openxmlformats.org/presentationml/2006/main">
+  <p:cSld>
+    <p:spTree>
+      <p:nvGrpSpPr>
+        <p:cNvPr id="1" name=""/>
+        <p:cNvGrpSpPr/>
+        <p:nvPr/>
+      </p:nvGrpSpPr>
+      <p:grpSpPr>
+        <a:xfrm>
+          <a:off x="0" y="0"/>
+          <a:ext cx="0" cy="0"/>
+          <a:chOff x="0" y="0"/>
+          <a:chExt cx="0" cy="0"/>
+        </a:xfrm>
+      </p:grpSpPr>
+      <p:sp>
+        <p:nvSpPr>
+          <p:cNvPr id="2" name="Title 1"/>
+          <p:cNvSpPr>
+            <a:spLocks noGrp="1"/>
+          </p:cNvSpPr>
+          <p:nvPr>
+            <p:ph type="title"/>
+          </p:nvPr>
+        </p:nvSpPr>
+        <p:spPr/>
+        <p:txBody>
+          <a:bodyPr/>
+          <a:lstStyle/>
+          <a:p>
+            <a:r>
+              <a:rPr lang="en-US" dirty="0" err="1" smtClean="0"/>
+              <a:t>Myc</a:t>
+            </a:r>
+            <a:r>
+              <a:rPr lang="en-US" dirty="0" smtClean="0"/>
+              <a:t>/PHB1 ratios in patient samples</a:t>
+            </a:r>
+            <a:endParaRPr lang="de-AT" dirty="0"/>
+          </a:p>
+        </p:txBody>
+      </p:sp>
+      <p:sp>
+        <p:nvSpPr>
+          <p:cNvPr id="5" name="Content Placeholder 4"/>
+          <p:cNvSpPr>
+            <a:spLocks noGrp="1"/>
+          </p:cNvSpPr>
+          <p:nvPr>
+            <p:ph idx="1"/>
+          </p:nvPr>
+        </p:nvSpPr>
+        <p:spPr/>
+        <p:txBody>
+          <a:bodyPr/>
+          <a:lstStyle/>
+          <a:p>
+            <a:endParaRPr lang="de-AT"/>
+          </a:p>
+        </p:txBody>
+      </p:sp>
+    </p:spTree>
+    <p:extLst>
+      <p:ext uri="{BB962C8B-B14F-4D97-AF65-F5344CB8AC3E}">
+        <p14:creationId xmlns:p14="http://schemas.microsoft.com/office/powerpoint/2010/main" val="2206862097"/>
+      </p:ext>
+    </p:extLst>
+  </p:cSld>
+  <p:clrMapOvr>
+    <a:masterClrMapping/>
+  </p:clrMapOvr>
+  <p:timing>
+    <p:tnLst>
+      <p:par>
+        <p:cTn id="1" dur="indefinite" restart="never" nodeType="tmRoot"/>
+      </p:par>
+    </p:tnLst>
+  </p:timing>
+</p:sld>
+</file>
+
+<file path=ppt/slides/slide6.xml><?xml version="1.0" encoding="utf-8"?>
+<p:sld xmlns:a="http://schemas.openxmlformats.org/drawingml/2006/main" xmlns:r="http://schemas.openxmlformats.org/officeDocument/2006/relationships" xmlns:p="http://schemas.openxmlformats.org/presentationml/2006/main">
+  <p:cSld>
+    <p:spTree>
+      <p:nvGrpSpPr>
+        <p:cNvPr id="1" name=""/>
+        <p:cNvGrpSpPr/>
+        <p:nvPr/>
+      </p:nvGrpSpPr>
+      <p:grpSpPr>
+        <a:xfrm>
+          <a:off x="0" y="0"/>
+          <a:ext cx="0" cy="0"/>
+          <a:chOff x="0" y="0"/>
+          <a:chExt cx="0" cy="0"/>
+        </a:xfrm>
+      </p:grpSpPr>
+      <p:sp>
+        <p:nvSpPr>
+          <p:cNvPr id="2" name="Title 1"/>
+          <p:cNvSpPr>
+            <a:spLocks noGrp="1"/>
+          </p:cNvSpPr>
+          <p:nvPr>
+            <p:ph type="title"/>
+          </p:nvPr>
+        </p:nvSpPr>
+        <p:spPr/>
+        <p:txBody>
+          <a:bodyPr/>
+          <a:lstStyle/>
+          <a:p>
+            <a:r>
+              <a:rPr lang="en-US" dirty="0" smtClean="0"/>
+              <a:t>Absolute BASP1 values in cell lines</a:t>
+            </a:r>
+            <a:endParaRPr lang="de-AT" dirty="0"/>
+          </a:p>
+        </p:txBody>
+      </p:sp>
+      <p:sp>
+        <p:nvSpPr>
+          <p:cNvPr id="3" name="Content Placeholder 2"/>
+          <p:cNvSpPr>
+            <a:spLocks noGrp="1"/>
+          </p:cNvSpPr>
+          <p:nvPr>
+            <p:ph idx="1"/>
+          </p:nvPr>
+        </p:nvSpPr>
+        <p:spPr/>
+        <p:txBody>
+          <a:bodyPr/>
+          <a:lstStyle/>
+          <a:p>
+            <a:endParaRPr lang="de-AT" dirty="0"/>
+          </a:p>
+        </p:txBody>
+      </p:sp>
+    </p:spTree>
+    <p:extLst>
+      <p:ext uri="{BB962C8B-B14F-4D97-AF65-F5344CB8AC3E}">
+        <p14:creationId xmlns:p14="http://schemas.microsoft.com/office/powerpoint/2010/main" val="2158690002"/>
+      </p:ext>
+    </p:extLst>
+  </p:cSld>
+  <p:clrMapOvr>
+    <a:masterClrMapping/>
+  </p:clrMapOvr>
+  <p:timing>
+    <p:tnLst>
+      <p:par>
+        <p:cTn id="1" dur="indefinite" restart="never" nodeType="tmRoot"/>
+      </p:par>
+    </p:tnLst>
+  </p:timing>
+</p:sld>
+</file>
+
+<file path=ppt/slides/slide7.xml><?xml version="1.0" encoding="utf-8"?>
+<p:sld xmlns:a="http://schemas.openxmlformats.org/drawingml/2006/main" xmlns:r="http://schemas.openxmlformats.org/officeDocument/2006/relationships" xmlns:p="http://schemas.openxmlformats.org/presentationml/2006/main">
+  <p:cSld>
+    <p:spTree>
+      <p:nvGrpSpPr>
+        <p:cNvPr id="1" name=""/>
+        <p:cNvGrpSpPr/>
+        <p:nvPr/>
+      </p:nvGrpSpPr>
+      <p:grpSpPr>
+        <a:xfrm>
+          <a:off x="0" y="0"/>
+          <a:ext cx="0" cy="0"/>
+          <a:chOff x="0" y="0"/>
+          <a:chExt cx="0" cy="0"/>
+        </a:xfrm>
+      </p:grpSpPr>
+      <p:sp>
+        <p:nvSpPr>
+          <p:cNvPr id="2" name="Title 1"/>
+          <p:cNvSpPr>
+            <a:spLocks noGrp="1"/>
+          </p:cNvSpPr>
+          <p:nvPr>
+            <p:ph type="title"/>
+          </p:nvPr>
+        </p:nvSpPr>
+        <p:spPr/>
+        <p:txBody>
+          <a:bodyPr/>
+          <a:lstStyle/>
+          <a:p>
+            <a:r>
+              <a:rPr lang="en-US" dirty="0" smtClean="0"/>
+              <a:t>Absolute </a:t>
+            </a:r>
+            <a:r>
+              <a:rPr lang="en-US" dirty="0" err="1" smtClean="0"/>
+              <a:t>Myc</a:t>
+            </a:r>
+            <a:r>
+              <a:rPr lang="en-US" dirty="0" smtClean="0"/>
+              <a:t> values in cell lines</a:t>
+            </a:r>
+            <a:endParaRPr lang="de-AT" dirty="0"/>
+          </a:p>
+        </p:txBody>
+      </p:sp>
+      <p:sp>
+        <p:nvSpPr>
+          <p:cNvPr id="3" name="Content Placeholder 2"/>
+          <p:cNvSpPr>
+            <a:spLocks noGrp="1"/>
+          </p:cNvSpPr>
+          <p:nvPr>
+            <p:ph idx="1"/>
+          </p:nvPr>
+        </p:nvSpPr>
+        <p:spPr/>
+        <p:txBody>
+          <a:bodyPr/>
+          <a:lstStyle/>
+          <a:p>
+            <a:endParaRPr lang="de-AT"/>
+          </a:p>
+        </p:txBody>
+      </p:sp>
+    </p:spTree>
+    <p:extLst>
+      <p:ext uri="{BB962C8B-B14F-4D97-AF65-F5344CB8AC3E}">
+        <p14:creationId xmlns:p14="http://schemas.microsoft.com/office/powerpoint/2010/main" val="3131738458"/>
+      </p:ext>
+    </p:extLst>
+  </p:cSld>
+  <p:clrMapOvr>
+    <a:masterClrMapping/>
+  </p:clrMapOvr>
+  <p:timing>
+    <p:tnLst>
+      <p:par>
+        <p:cTn id="1" dur="indefinite" restart="never" nodeType="tmRoot"/>
+      </p:par>
+    </p:tnLst>
+  </p:timing>
+</p:sld>
+</file>
+
+<file path=ppt/slides/slide8.xml><?xml version="1.0" encoding="utf-8"?>
+<p:sld xmlns:a="http://schemas.openxmlformats.org/drawingml/2006/main" xmlns:r="http://schemas.openxmlformats.org/officeDocument/2006/relationships" xmlns:p="http://schemas.openxmlformats.org/presentationml/2006/main">
+  <p:cSld>
+    <p:spTree>
+      <p:nvGrpSpPr>
+        <p:cNvPr id="1" name=""/>
+        <p:cNvGrpSpPr/>
+        <p:nvPr/>
+      </p:nvGrpSpPr>
+      <p:grpSpPr>
+        <a:xfrm>
+          <a:off x="0" y="0"/>
+          <a:ext cx="0" cy="0"/>
+          <a:chOff x="0" y="0"/>
+          <a:chExt cx="0" cy="0"/>
+        </a:xfrm>
+      </p:grpSpPr>
+      <p:sp>
+        <p:nvSpPr>
+          <p:cNvPr id="2" name="Title 1"/>
+          <p:cNvSpPr>
+            <a:spLocks noGrp="1"/>
+          </p:cNvSpPr>
+          <p:nvPr>
+            <p:ph type="title"/>
+          </p:nvPr>
+        </p:nvSpPr>
+        <p:spPr/>
+        <p:txBody>
+          <a:bodyPr/>
+          <a:lstStyle/>
+          <a:p>
+            <a:r>
+              <a:rPr lang="en-US" dirty="0" smtClean="0"/>
+              <a:t>RPKM vs. RSEM problem</a:t>
+            </a:r>
+            <a:endParaRPr lang="de-AT" dirty="0"/>
+          </a:p>
+        </p:txBody>
+      </p:sp>
+      <p:sp>
+        <p:nvSpPr>
+          <p:cNvPr id="3" name="Content Placeholder 2"/>
+          <p:cNvSpPr>
+            <a:spLocks noGrp="1"/>
+          </p:cNvSpPr>
+          <p:nvPr>
+            <p:ph idx="1"/>
+          </p:nvPr>
+        </p:nvSpPr>
+        <p:spPr/>
+        <p:txBody>
+          <a:bodyPr/>
+          <a:lstStyle/>
+          <a:p>
+            <a:endParaRPr lang="de-AT"/>
+          </a:p>
+        </p:txBody>
+      </p:sp>
+    </p:spTree>
+    <p:extLst>
+      <p:ext uri="{BB962C8B-B14F-4D97-AF65-F5344CB8AC3E}">
+        <p14:creationId xmlns:p14="http://schemas.microsoft.com/office/powerpoint/2010/main" val="1537968073"/>
+      </p:ext>
+    </p:extLst>
+  </p:cSld>
+  <p:clrMapOvr>
+    <a:masterClrMapping/>
+  </p:clrMapOvr>
+  <p:timing>
+    <p:tnLst>
+      <p:par>
+        <p:cTn id="1" dur="indefinite" restart="never" nodeType="tmRoot"/>
+      </p:par>
+    </p:tnLst>
+  </p:timing>
+</p:sld>
+</file>
+
+<file path=ppt/slides/slide9.xml><?xml version="1.0" encoding="utf-8"?>
+<p:sld xmlns:a="http://schemas.openxmlformats.org/drawingml/2006/main" xmlns:r="http://schemas.openxmlformats.org/officeDocument/2006/relationships" xmlns:p="http://schemas.openxmlformats.org/presentationml/2006/main">
+  <p:cSld>
+    <p:spTree>
+      <p:nvGrpSpPr>
+        <p:cNvPr id="1" name=""/>
+        <p:cNvGrpSpPr/>
+        <p:nvPr/>
+      </p:nvGrpSpPr>
+      <p:grpSpPr>
+        <a:xfrm>
+          <a:off x="0" y="0"/>
+          <a:ext cx="0" cy="0"/>
+          <a:chOff x="0" y="0"/>
+          <a:chExt cx="0" cy="0"/>
+        </a:xfrm>
+      </p:grpSpPr>
+      <p:sp>
+        <p:nvSpPr>
+          <p:cNvPr id="2" name="Title 1"/>
+          <p:cNvSpPr>
+            <a:spLocks noGrp="1"/>
+          </p:cNvSpPr>
+          <p:nvPr>
+            <p:ph type="title"/>
+          </p:nvPr>
+        </p:nvSpPr>
+        <p:spPr/>
+        <p:txBody>
+          <a:bodyPr/>
+          <a:lstStyle/>
+          <a:p>
+            <a:r>
+              <a:rPr lang="en-US" dirty="0" smtClean="0"/>
+              <a:t>Additional images (high res)</a:t>
+            </a:r>
+            <a:endParaRPr lang="de-AT" dirty="0"/>
+          </a:p>
+        </p:txBody>
+      </p:sp>
+      <p:sp>
+        <p:nvSpPr>
+          <p:cNvPr id="3" name="Content Placeholder 2"/>
+          <p:cNvSpPr>
+            <a:spLocks noGrp="1"/>
+          </p:cNvSpPr>
+          <p:nvPr>
+            <p:ph idx="1"/>
+          </p:nvPr>
+        </p:nvSpPr>
+        <p:spPr/>
+        <p:txBody>
+          <a:bodyPr/>
+          <a:lstStyle/>
+          <a:p>
+            <a:endParaRPr lang="de-AT"/>
+          </a:p>
+        </p:txBody>
+      </p:sp>
+    </p:spTree>
+    <p:extLst>
+      <p:ext uri="{BB962C8B-B14F-4D97-AF65-F5344CB8AC3E}">
+        <p14:creationId xmlns:p14="http://schemas.microsoft.com/office/powerpoint/2010/main" val="722918196"/>
+      </p:ext>
+    </p:extLst>
+  </p:cSld>
+  <p:clrMapOvr>
+    <a:masterClrMapping/>
+  </p:clrMapOvr>
+  <p:timing>
+    <p:tnLst>
+      <p:par>
+        <p:cTn id="1" dur="indefinite" restart="never" nodeType="tmRoot"/>
+      </p:par>
+    </p:tnLst>
+  </p:timing>
 </p:sld>
 </file>
 

</xml_diff>